<commit_message>
Y2A - MS Teams Assignment Template add + Y1A Learning Log Update
</commit_message>
<xml_diff>
--- a/docs/Year1/BlockA/MS Teams Assignment Template/Learning Log 2022-23A ADS_AI.pptx
+++ b/docs/Year1/BlockA/MS Teams Assignment Template/Learning Log 2022-23A ADS_AI.pptx
@@ -24106,6 +24106,23 @@
 </file>
 
 <file path=customXml/item1.xml><?xml version="1.0" encoding="utf-8"?>
+<?mso-contentType ?>
+<FormTemplates xmlns="http://schemas.microsoft.com/sharepoint/v3/contenttype/forms">
+  <Display>DocumentLibraryForm</Display>
+  <Edit>DocumentLibraryForm</Edit>
+  <New>DocumentLibraryForm</New>
+</FormTemplates>
+</file>
+
+<file path=customXml/item2.xml><?xml version="1.0" encoding="utf-8"?>
+<p:properties xmlns:p="http://schemas.microsoft.com/office/2006/metadata/properties" xmlns:xsi="http://www.w3.org/2001/XMLSchema-instance" xmlns:pc="http://schemas.microsoft.com/office/infopath/2007/PartnerControls">
+  <documentManagement>
+    <ReferenceId xmlns="0985a443-d2af-4487-ab99-abd7888ad824" xsi:nil="true"/>
+  </documentManagement>
+</p:properties>
+</file>
+
+<file path=customXml/item3.xml><?xml version="1.0" encoding="utf-8"?>
 <ct:contentTypeSchema xmlns:ct="http://schemas.microsoft.com/office/2006/metadata/contentType" xmlns:ma="http://schemas.microsoft.com/office/2006/metadata/properties/metaAttributes" ct:_="" ma:_="" ma:contentTypeName="Document" ma:contentTypeID="0x010100D100A5847EBE4D438975065372C3191E" ma:contentTypeVersion="1" ma:contentTypeDescription="Create a new document." ma:contentTypeScope="" ma:versionID="ece06d0419c1a06f9261605a6634a7bf">
   <xsd:schema xmlns:xsd="http://www.w3.org/2001/XMLSchema" xmlns:xs="http://www.w3.org/2001/XMLSchema" xmlns:p="http://schemas.microsoft.com/office/2006/metadata/properties" xmlns:ns2="0985a443-d2af-4487-ab99-abd7888ad824" targetNamespace="http://schemas.microsoft.com/office/2006/metadata/properties" ma:root="true" ma:fieldsID="0075ca7f51c04d59e7848e806bb0dbb1" ns2:_="">
     <xsd:import namespace="0985a443-d2af-4487-ab99-abd7888ad824"/>
@@ -24231,24 +24248,31 @@
 </ct:contentTypeSchema>
 </file>
 
-<file path=customXml/item2.xml><?xml version="1.0" encoding="utf-8"?>
-<?mso-contentType ?>
-<FormTemplates xmlns="http://schemas.microsoft.com/sharepoint/v3/contenttype/forms">
-  <Display>DocumentLibraryForm</Display>
-  <Edit>DocumentLibraryForm</Edit>
-  <New>DocumentLibraryForm</New>
-</FormTemplates>
+<file path=customXml/itemProps1.xml><?xml version="1.0" encoding="utf-8"?>
+<ds:datastoreItem xmlns:ds="http://schemas.openxmlformats.org/officeDocument/2006/customXml" ds:itemID="{98D9791E-52D0-4ABB-925A-4EAECF798D9B}">
+  <ds:schemaRefs>
+    <ds:schemaRef ds:uri="http://schemas.microsoft.com/sharepoint/v3/contenttype/forms"/>
+  </ds:schemaRefs>
+</ds:datastoreItem>
 </file>
 
-<file path=customXml/item3.xml><?xml version="1.0" encoding="utf-8"?>
-<p:properties xmlns:p="http://schemas.microsoft.com/office/2006/metadata/properties" xmlns:xsi="http://www.w3.org/2001/XMLSchema-instance" xmlns:pc="http://schemas.microsoft.com/office/infopath/2007/PartnerControls">
-  <documentManagement>
-    <ReferenceId xmlns="0985a443-d2af-4487-ab99-abd7888ad824" xsi:nil="true"/>
-  </documentManagement>
-</p:properties>
+<file path=customXml/itemProps2.xml><?xml version="1.0" encoding="utf-8"?>
+<ds:datastoreItem xmlns:ds="http://schemas.openxmlformats.org/officeDocument/2006/customXml" ds:itemID="{3067B86F-F5BB-4BE6-9A37-0E19E53CB68B}">
+  <ds:schemaRefs>
+    <ds:schemaRef ds:uri="http://purl.org/dc/terms/"/>
+    <ds:schemaRef ds:uri="http://schemas.microsoft.com/office/2006/documentManagement/types"/>
+    <ds:schemaRef ds:uri="http://www.w3.org/XML/1998/namespace"/>
+    <ds:schemaRef ds:uri="http://schemas.microsoft.com/office/2006/metadata/properties"/>
+    <ds:schemaRef ds:uri="http://purl.org/dc/elements/1.1/"/>
+    <ds:schemaRef ds:uri="http://schemas.microsoft.com/office/infopath/2007/PartnerControls"/>
+    <ds:schemaRef ds:uri="http://schemas.openxmlformats.org/package/2006/metadata/core-properties"/>
+    <ds:schemaRef ds:uri="http://purl.org/dc/dcmitype/"/>
+    <ds:schemaRef ds:uri="0985a443-d2af-4487-ab99-abd7888ad824"/>
+  </ds:schemaRefs>
+</ds:datastoreItem>
 </file>
 
-<file path=customXml/itemProps1.xml><?xml version="1.0" encoding="utf-8"?>
+<file path=customXml/itemProps3.xml><?xml version="1.0" encoding="utf-8"?>
 <ds:datastoreItem xmlns:ds="http://schemas.openxmlformats.org/officeDocument/2006/customXml" ds:itemID="{D2738D89-933C-470B-A6BC-C7AE70C1F847}">
   <ds:schemaRefs>
     <ds:schemaRef ds:uri="http://schemas.microsoft.com/office/2006/metadata/contentType"/>
@@ -24264,28 +24288,4 @@
     <ds:schemaRef ds:uri="http://schemas.microsoft.com/internal/obd"/>
   </ds:schemaRefs>
 </ds:datastoreItem>
-</file>
-
-<file path=customXml/itemProps2.xml><?xml version="1.0" encoding="utf-8"?>
-<ds:datastoreItem xmlns:ds="http://schemas.openxmlformats.org/officeDocument/2006/customXml" ds:itemID="{98D9791E-52D0-4ABB-925A-4EAECF798D9B}">
-  <ds:schemaRefs>
-    <ds:schemaRef ds:uri="http://schemas.microsoft.com/sharepoint/v3/contenttype/forms"/>
-  </ds:schemaRefs>
-</ds:datastoreItem>
-</file>
-
-<file path=customXml/itemProps3.xml><?xml version="1.0" encoding="utf-8"?>
-<ds:datastoreItem xmlns:ds="http://schemas.openxmlformats.org/officeDocument/2006/customXml" ds:itemID="{3067B86F-F5BB-4BE6-9A37-0E19E53CB68B}">
-  <ds:schemaRefs>
-    <ds:schemaRef ds:uri="http://purl.org/dc/terms/"/>
-    <ds:schemaRef ds:uri="http://schemas.microsoft.com/office/2006/documentManagement/types"/>
-    <ds:schemaRef ds:uri="http://www.w3.org/XML/1998/namespace"/>
-    <ds:schemaRef ds:uri="http://schemas.microsoft.com/office/2006/metadata/properties"/>
-    <ds:schemaRef ds:uri="http://purl.org/dc/elements/1.1/"/>
-    <ds:schemaRef ds:uri="http://schemas.microsoft.com/office/infopath/2007/PartnerControls"/>
-    <ds:schemaRef ds:uri="http://schemas.openxmlformats.org/package/2006/metadata/core-properties"/>
-    <ds:schemaRef ds:uri="http://purl.org/dc/dcmitype/"/>
-    <ds:schemaRef ds:uri="0985a443-d2af-4487-ab99-abd7888ad824"/>
-  </ds:schemaRefs>
-</ds:datastoreItem>
 </file>
</xml_diff>